<commit_message>
#15 #14 Added the login functionality for users
Also began working on the initial website design
</commit_message>
<xml_diff>
--- a/Resources/Project Demo 1.pptx
+++ b/Resources/Project Demo 1.pptx
@@ -5,10 +5,10 @@
     <p:sldMasterId id="2147483648" r:id="rId4"/>
   </p:sldMasterIdLst>
   <p:notesMasterIdLst>
-    <p:notesMasterId r:id="rId16"/>
+    <p:notesMasterId r:id="rId15"/>
   </p:notesMasterIdLst>
   <p:handoutMasterIdLst>
-    <p:handoutMasterId r:id="rId17"/>
+    <p:handoutMasterId r:id="rId16"/>
   </p:handoutMasterIdLst>
   <p:sldIdLst>
     <p:sldId id="256" r:id="rId5"/>
@@ -21,7 +21,6 @@
     <p:sldId id="264" r:id="rId12"/>
     <p:sldId id="265" r:id="rId13"/>
     <p:sldId id="266" r:id="rId14"/>
-    <p:sldId id="258" r:id="rId15"/>
   </p:sldIdLst>
   <p:sldSz cx="12192000" cy="6858000"/>
   <p:notesSz cx="6858000" cy="9144000"/>
@@ -225,7 +224,7 @@
           <a:p>
             <a:fld id="{73B2889B-A0AC-4482-8592-5C96F2309420}" type="datetimeFigureOut">
               <a:rPr lang="en-US" smtClean="0"/>
-              <a:t>11/19/2020</a:t>
+              <a:t>11/21/2020</a:t>
             </a:fld>
             <a:endParaRPr lang="en-US"/>
           </a:p>
@@ -402,7 +401,7 @@
           <a:p>
             <a:fld id="{830EB223-FFC0-462A-A3B8-EAA7CE0F8CBD}" type="datetimeFigureOut">
               <a:rPr lang="en-US" smtClean="0"/>
-              <a:t>11/19/2020</a:t>
+              <a:t>11/21/2020</a:t>
             </a:fld>
             <a:endParaRPr lang="en-US" dirty="0"/>
           </a:p>
@@ -799,7 +798,7 @@
           <a:p>
             <a:r>
               <a:rPr lang="en-US" dirty="0"/>
-              <a:t>The main goal of my project is to develop a system using modern technologies and processes that could provide a potential solution to a modern problem.</a:t>
+              <a:t>The main goal of my project was to develop a system using modern technologies and processes that could provide a potential solution to a modern problem.</a:t>
             </a:r>
           </a:p>
         </p:txBody>
@@ -886,7 +885,7 @@
           <a:p>
             <a:r>
               <a:rPr lang="en-US" dirty="0"/>
-              <a:t>The problem I identified and decided to tackle is the impact that recent services such Just eat and Deliveroo are having on traditional brick and mortar dine in restaurants. Just as the growth in e commerce has affected other markets such as consumer electronics, leading to the closure of many electronics stores globally.</a:t>
+              <a:t>The problem I identified and decided to tackle is that there is no uniform or standard way for businesses to take reservations from there customers. Many companies resort to using various messenger services or in some cases making dedicated apps or websites.</a:t>
             </a:r>
           </a:p>
         </p:txBody>
@@ -973,16 +972,7 @@
           <a:p>
             <a:r>
               <a:rPr lang="en-US" dirty="0"/>
-              <a:t>The goal is not to create competition with the delivery services but to provide a substitute service which may appeal to some consumers.</a:t>
-            </a:r>
-          </a:p>
-          <a:p>
-            <a:endParaRPr lang="en-US" dirty="0"/>
-          </a:p>
-          <a:p>
-            <a:r>
-              <a:rPr lang="en-US" dirty="0"/>
-              <a:t>There would be nothing stopping such restaurants also registering with a delivery service to provide a takeaway menu.</a:t>
+              <a:t>The goal is to create an easy-to-use online service that would allow users to search for a particular service or business in their area and make a booking. The businesses could list their available services, availability and pricing.</a:t>
             </a:r>
           </a:p>
         </p:txBody>
@@ -1069,19 +1059,19 @@
           <a:p>
             <a:r>
               <a:rPr lang="en-US" dirty="0"/>
-              <a:t>The aim of the system is to create a platform that will be easy to use by both the restaurants and their customers. </a:t>
+              <a:t>The aim of the system is to create a platform that will be easy to use by both the businesses and their customers. </a:t>
             </a:r>
           </a:p>
           <a:p>
             <a:r>
               <a:rPr lang="en-US" dirty="0"/>
-              <a:t>Customers should be able to search for restaurants and view their menus and premises.</a:t>
+              <a:t>Customers should be able to search for the type of service they require and view the available options in their area.</a:t>
             </a:r>
           </a:p>
           <a:p>
             <a:r>
               <a:rPr lang="en-US" dirty="0"/>
-              <a:t>Once they find a place they like, they will be able to make a reservation at an available time and pre-order their food if they would like to save time on arrival.</a:t>
+              <a:t>Once they find a business they like, they will be able to make a reservation at an available time and pre-pay for services with set prices.</a:t>
             </a:r>
           </a:p>
         </p:txBody>
@@ -1168,7 +1158,7 @@
           <a:p>
             <a:r>
               <a:rPr lang="en-US" sz="2000" dirty="0"/>
-              <a:t>I plan to use a layered architecture consisting of a Presentation, Service and Persistence layers. This proposed architecture was originally going to be a typical model view controller architecture however the addition of amazon s3 for image storage meant that the model layer was no longer just the model but now it is a persistence layer.</a:t>
+              <a:t>I plan to use a layered architecture consisting of a Presentation, Service and Persistence layers.</a:t>
             </a:r>
           </a:p>
           <a:p>
@@ -1177,7 +1167,16 @@
           <a:p>
             <a:r>
               <a:rPr lang="en-US" sz="2000" dirty="0"/>
-              <a:t>Along with the layered architecture I have decided to use microservices, I wanted to use microservices so that I can easily incorporate a continuous integration and delivery system and to allow for much easier scalability and flexibility.</a:t>
+              <a:t>My proposed architecture was originally going to be a typical model view controller architecture however the addition of amazon s3 for image storage meant that the model layer was no longer just the model but now it is a persistence layer.</a:t>
+            </a:r>
+          </a:p>
+          <a:p>
+            <a:endParaRPr lang="en-US" sz="2000" dirty="0"/>
+          </a:p>
+          <a:p>
+            <a:r>
+              <a:rPr lang="en-US" sz="2000" dirty="0"/>
+              <a:t>Along with the layered architecture I have decided to use microservices, I wanted to use microservices so that I can easily incorporate a continuous integration and delivery system and to allow for much easier scalability and flexibility. And also the technologies behind them just interest me in general.</a:t>
             </a:r>
           </a:p>
           <a:p>
@@ -1236,7 +1235,7 @@
             </a:pPr>
             <a:r>
               <a:rPr lang="en-US" sz="2000" dirty="0"/>
-              <a:t>The PRESENTATION layer can also request images from amazon s3 using the URLs received within the data retrieved from the SERVICE layer.</a:t>
+              <a:t>The PRESENTATION layer can also request images from amazon s3 using the URLs received within the data from the SERVICE layer.</a:t>
             </a:r>
           </a:p>
           <a:p>
@@ -1309,7 +1308,7 @@
             </a:pPr>
             <a:r>
               <a:rPr lang="en-US" sz="2000" dirty="0"/>
-              <a:t>The PERSISTENCE layer is also home to the amazon S3 storage bucket. This is currently contacted by the directly by the PRESENTATION layer to store and view images. If the need arises to modify or edit the images before uploading them, the storage of the images may be moved to the service layer to take processing load away from the client in the interest of speed.</a:t>
+              <a:t>The PERSISTENCE layer is also home to the amazon S3 storage bucket. This is currently contacted by the directly by the PRESENTATION layer to store and view images. However if the need arises to modify or edit the images before uploading them, the storage of the images may be moved to the service layer to take processing load away from the client in the interest of speed.</a:t>
             </a:r>
           </a:p>
           <a:p>
@@ -1574,6 +1573,90 @@
     <p:extLst>
       <p:ext uri="{BB962C8B-B14F-4D97-AF65-F5344CB8AC3E}">
         <p14:creationId xmlns:p14="http://schemas.microsoft.com/office/powerpoint/2010/main" val="1946045888"/>
+      </p:ext>
+    </p:extLst>
+  </p:cSld>
+  <p:clrMapOvr>
+    <a:masterClrMapping/>
+  </p:clrMapOvr>
+</p:notes>
+</file>
+
+<file path=ppt/notesSlides/notesSlide9.xml><?xml version="1.0" encoding="utf-8"?>
+<p:notes xmlns:a="http://schemas.openxmlformats.org/drawingml/2006/main" xmlns:r="http://schemas.openxmlformats.org/officeDocument/2006/relationships" xmlns:p="http://schemas.openxmlformats.org/presentationml/2006/main">
+  <p:cSld>
+    <p:spTree>
+      <p:nvGrpSpPr>
+        <p:cNvPr id="1" name=""/>
+        <p:cNvGrpSpPr/>
+        <p:nvPr/>
+      </p:nvGrpSpPr>
+      <p:grpSpPr>
+        <a:xfrm>
+          <a:off x="0" y="0"/>
+          <a:ext cx="0" cy="0"/>
+          <a:chOff x="0" y="0"/>
+          <a:chExt cx="0" cy="0"/>
+        </a:xfrm>
+      </p:grpSpPr>
+      <p:sp>
+        <p:nvSpPr>
+          <p:cNvPr id="2" name="Slide Image Placeholder 1"/>
+          <p:cNvSpPr>
+            <a:spLocks noGrp="1" noRot="1" noChangeAspect="1"/>
+          </p:cNvSpPr>
+          <p:nvPr>
+            <p:ph type="sldImg"/>
+          </p:nvPr>
+        </p:nvSpPr>
+        <p:spPr/>
+      </p:sp>
+      <p:sp>
+        <p:nvSpPr>
+          <p:cNvPr id="3" name="Notes Placeholder 2"/>
+          <p:cNvSpPr>
+            <a:spLocks noGrp="1"/>
+          </p:cNvSpPr>
+          <p:nvPr>
+            <p:ph type="body" idx="1"/>
+          </p:nvPr>
+        </p:nvSpPr>
+        <p:spPr/>
+        <p:txBody>
+          <a:bodyPr/>
+          <a:lstStyle/>
+          <a:p>
+            <a:endParaRPr lang="en-US" dirty="0"/>
+          </a:p>
+        </p:txBody>
+      </p:sp>
+      <p:sp>
+        <p:nvSpPr>
+          <p:cNvPr id="4" name="Slide Number Placeholder 3"/>
+          <p:cNvSpPr>
+            <a:spLocks noGrp="1"/>
+          </p:cNvSpPr>
+          <p:nvPr>
+            <p:ph type="sldNum" sz="quarter" idx="5"/>
+          </p:nvPr>
+        </p:nvSpPr>
+        <p:spPr/>
+        <p:txBody>
+          <a:bodyPr/>
+          <a:lstStyle/>
+          <a:p>
+            <a:fld id="{BC849E9A-41F7-4779-A581-48A7C374A227}" type="slidenum">
+              <a:rPr lang="en-US" smtClean="0"/>
+              <a:t>9</a:t>
+            </a:fld>
+            <a:endParaRPr lang="en-US" dirty="0"/>
+          </a:p>
+        </p:txBody>
+      </p:sp>
+    </p:spTree>
+    <p:extLst>
+      <p:ext uri="{BB962C8B-B14F-4D97-AF65-F5344CB8AC3E}">
+        <p14:creationId xmlns:p14="http://schemas.microsoft.com/office/powerpoint/2010/main" val="1117325606"/>
       </p:ext>
     </p:extLst>
   </p:cSld>
@@ -1730,7 +1813,7 @@
           <a:p>
             <a:fld id="{DECF21A4-E71B-4D3A-AF45-E989C23A7BB1}" type="datetimeFigureOut">
               <a:rPr lang="en-US" smtClean="0"/>
-              <a:t>11/19/2020</a:t>
+              <a:t>11/21/2020</a:t>
             </a:fld>
             <a:endParaRPr lang="en-US" dirty="0"/>
           </a:p>
@@ -1928,7 +2011,7 @@
           <a:p>
             <a:fld id="{DECF21A4-E71B-4D3A-AF45-E989C23A7BB1}" type="datetimeFigureOut">
               <a:rPr lang="en-US" smtClean="0"/>
-              <a:t>11/19/2020</a:t>
+              <a:t>11/21/2020</a:t>
             </a:fld>
             <a:endParaRPr lang="en-US" dirty="0"/>
           </a:p>
@@ -2136,7 +2219,7 @@
           <a:p>
             <a:fld id="{DECF21A4-E71B-4D3A-AF45-E989C23A7BB1}" type="datetimeFigureOut">
               <a:rPr lang="en-US" smtClean="0"/>
-              <a:t>11/19/2020</a:t>
+              <a:t>11/21/2020</a:t>
             </a:fld>
             <a:endParaRPr lang="en-US" dirty="0"/>
           </a:p>
@@ -2334,7 +2417,7 @@
           <a:p>
             <a:fld id="{DECF21A4-E71B-4D3A-AF45-E989C23A7BB1}" type="datetimeFigureOut">
               <a:rPr lang="en-US" smtClean="0"/>
-              <a:t>11/19/2020</a:t>
+              <a:t>11/21/2020</a:t>
             </a:fld>
             <a:endParaRPr lang="en-US" dirty="0"/>
           </a:p>
@@ -2609,7 +2692,7 @@
           <a:p>
             <a:fld id="{DECF21A4-E71B-4D3A-AF45-E989C23A7BB1}" type="datetimeFigureOut">
               <a:rPr lang="en-US" smtClean="0"/>
-              <a:t>11/19/2020</a:t>
+              <a:t>11/21/2020</a:t>
             </a:fld>
             <a:endParaRPr lang="en-US" dirty="0"/>
           </a:p>
@@ -2874,7 +2957,7 @@
           <a:p>
             <a:fld id="{DECF21A4-E71B-4D3A-AF45-E989C23A7BB1}" type="datetimeFigureOut">
               <a:rPr lang="en-US" smtClean="0"/>
-              <a:t>11/19/2020</a:t>
+              <a:t>11/21/2020</a:t>
             </a:fld>
             <a:endParaRPr lang="en-US" dirty="0"/>
           </a:p>
@@ -3286,7 +3369,7 @@
           <a:p>
             <a:fld id="{DECF21A4-E71B-4D3A-AF45-E989C23A7BB1}" type="datetimeFigureOut">
               <a:rPr lang="en-US" smtClean="0"/>
-              <a:t>11/19/2020</a:t>
+              <a:t>11/21/2020</a:t>
             </a:fld>
             <a:endParaRPr lang="en-US" dirty="0"/>
           </a:p>
@@ -3427,7 +3510,7 @@
           <a:p>
             <a:fld id="{DECF21A4-E71B-4D3A-AF45-E989C23A7BB1}" type="datetimeFigureOut">
               <a:rPr lang="en-US" smtClean="0"/>
-              <a:t>11/19/2020</a:t>
+              <a:t>11/21/2020</a:t>
             </a:fld>
             <a:endParaRPr lang="en-US" dirty="0"/>
           </a:p>
@@ -3540,7 +3623,7 @@
           <a:p>
             <a:fld id="{DECF21A4-E71B-4D3A-AF45-E989C23A7BB1}" type="datetimeFigureOut">
               <a:rPr lang="en-US" smtClean="0"/>
-              <a:t>11/19/2020</a:t>
+              <a:t>11/21/2020</a:t>
             </a:fld>
             <a:endParaRPr lang="en-US" dirty="0"/>
           </a:p>
@@ -3851,7 +3934,7 @@
           <a:p>
             <a:fld id="{DECF21A4-E71B-4D3A-AF45-E989C23A7BB1}" type="datetimeFigureOut">
               <a:rPr lang="en-US" smtClean="0"/>
-              <a:t>11/19/2020</a:t>
+              <a:t>11/21/2020</a:t>
             </a:fld>
             <a:endParaRPr lang="en-US" dirty="0"/>
           </a:p>
@@ -4143,7 +4226,7 @@
           <a:p>
             <a:fld id="{DECF21A4-E71B-4D3A-AF45-E989C23A7BB1}" type="datetimeFigureOut">
               <a:rPr lang="en-US" smtClean="0"/>
-              <a:t>11/19/2020</a:t>
+              <a:t>11/21/2020</a:t>
             </a:fld>
             <a:endParaRPr lang="en-US" dirty="0"/>
           </a:p>
@@ -4384,7 +4467,7 @@
           <a:p>
             <a:fld id="{DECF21A4-E71B-4D3A-AF45-E989C23A7BB1}" type="datetimeFigureOut">
               <a:rPr lang="en-US" smtClean="0"/>
-              <a:t>11/19/2020</a:t>
+              <a:t>11/21/2020</a:t>
             </a:fld>
             <a:endParaRPr lang="en-US" dirty="0"/>
           </a:p>
@@ -5119,14 +5202,14 @@
           <a:p>
             <a:pPr algn="l"/>
             <a:r>
-              <a:rPr lang="en-US" sz="7200">
+              <a:rPr lang="en-US" sz="7200" dirty="0">
                 <a:solidFill>
                   <a:srgbClr val="FFFFFF"/>
                 </a:solidFill>
                 <a:latin typeface="Franklin Gothic Book" panose="020B0503020102020204" pitchFamily="34" charset="0"/>
                 <a:cs typeface="Segoe UI" panose="020B0502040204020203" pitchFamily="34" charset="0"/>
               </a:rPr>
-              <a:t>Project Demo</a:t>
+              <a:t>Booking Ally</a:t>
             </a:r>
           </a:p>
         </p:txBody>
@@ -5161,7 +5244,7 @@
           <a:p>
             <a:pPr algn="l"/>
             <a:r>
-              <a:rPr lang="en-US">
+              <a:rPr lang="en-US" dirty="0">
                 <a:solidFill>
                   <a:srgbClr val="FFFFFF"/>
                 </a:solidFill>
@@ -5773,388 +5856,6 @@
 </p:sld>
 </file>
 
-<file path=ppt/slides/slide11.xml><?xml version="1.0" encoding="utf-8"?>
-<p:sld xmlns:a="http://schemas.openxmlformats.org/drawingml/2006/main" xmlns:r="http://schemas.openxmlformats.org/officeDocument/2006/relationships" xmlns:p="http://schemas.openxmlformats.org/presentationml/2006/main">
-  <p:cSld>
-    <p:bg>
-      <p:bgPr>
-        <a:solidFill>
-          <a:schemeClr val="bg1">
-            <a:tint val="95000"/>
-            <a:satMod val="170000"/>
-          </a:schemeClr>
-        </a:solidFill>
-        <a:effectLst/>
-      </p:bgPr>
-    </p:bg>
-    <p:spTree>
-      <p:nvGrpSpPr>
-        <p:cNvPr id="1" name=""/>
-        <p:cNvGrpSpPr/>
-        <p:nvPr/>
-      </p:nvGrpSpPr>
-      <p:grpSpPr>
-        <a:xfrm>
-          <a:off x="0" y="0"/>
-          <a:ext cx="0" cy="0"/>
-          <a:chOff x="0" y="0"/>
-          <a:chExt cx="0" cy="0"/>
-        </a:xfrm>
-      </p:grpSpPr>
-      <p:sp>
-        <p:nvSpPr>
-          <p:cNvPr id="2" name="Title 1">
-            <a:extLst>
-              <a:ext uri="{FF2B5EF4-FFF2-40B4-BE49-F238E27FC236}">
-                <a16:creationId xmlns:a16="http://schemas.microsoft.com/office/drawing/2014/main" id="{B9529917-FCA0-425A-B13C-E4765475F952}"/>
-              </a:ext>
-            </a:extLst>
-          </p:cNvPr>
-          <p:cNvSpPr>
-            <a:spLocks noGrp="1"/>
-          </p:cNvSpPr>
-          <p:nvPr>
-            <p:ph type="title"/>
-          </p:nvPr>
-        </p:nvSpPr>
-        <p:spPr>
-          <a:xfrm>
-            <a:off x="804673" y="1445494"/>
-            <a:ext cx="3616856" cy="4376572"/>
-          </a:xfrm>
-        </p:spPr>
-        <p:txBody>
-          <a:bodyPr anchor="ctr">
-            <a:normAutofit/>
-          </a:bodyPr>
-          <a:lstStyle/>
-          <a:p>
-            <a:r>
-              <a:rPr lang="en-US" sz="4800"/>
-              <a:t>References</a:t>
-            </a:r>
-          </a:p>
-        </p:txBody>
-      </p:sp>
-      <p:sp>
-        <p:nvSpPr>
-          <p:cNvPr id="12" name="Freeform: Shape 7">
-            <a:extLst>
-              <a:ext uri="{FF2B5EF4-FFF2-40B4-BE49-F238E27FC236}">
-                <a16:creationId xmlns:a16="http://schemas.microsoft.com/office/drawing/2014/main" id="{DFF2AC85-FAA0-4844-813F-83C04D7382E2}"/>
-              </a:ext>
-              <a:ext uri="{C183D7F6-B498-43B3-948B-1728B52AA6E4}">
-                <adec:decorative xmlns:adec="http://schemas.microsoft.com/office/drawing/2017/decorative" val="1"/>
-              </a:ext>
-            </a:extLst>
-          </p:cNvPr>
-          <p:cNvSpPr>
-            <a:spLocks noGrp="1" noRot="1" noChangeAspect="1" noMove="1" noResize="1" noEditPoints="1" noAdjustHandles="1" noChangeArrowheads="1" noChangeShapeType="1" noTextEdit="1"/>
-          </p:cNvSpPr>
-          <p:nvPr>
-            <p:extLst>
-              <p:ext uri="{386F3935-93C4-4BCD-93E2-E3B085C9AB24}">
-                <p16:designElem xmlns:p16="http://schemas.microsoft.com/office/powerpoint/2015/main" val="1"/>
-              </p:ext>
-            </p:extLst>
-          </p:nvPr>
-        </p:nvSpPr>
-        <p:spPr>
-          <a:xfrm>
-            <a:off x="4907636" y="0"/>
-            <a:ext cx="7281316" cy="6858000"/>
-          </a:xfrm>
-          <a:custGeom>
-            <a:avLst/>
-            <a:gdLst>
-              <a:gd name="connsiteX0" fmla="*/ 361354 w 7281316"/>
-              <a:gd name="connsiteY0" fmla="*/ 0 h 6858000"/>
-              <a:gd name="connsiteX1" fmla="*/ 7281316 w 7281316"/>
-              <a:gd name="connsiteY1" fmla="*/ 0 h 6858000"/>
-              <a:gd name="connsiteX2" fmla="*/ 7281316 w 7281316"/>
-              <a:gd name="connsiteY2" fmla="*/ 6858000 h 6858000"/>
-              <a:gd name="connsiteX3" fmla="*/ 696735 w 7281316"/>
-              <a:gd name="connsiteY3" fmla="*/ 6858000 h 6858000"/>
-              <a:gd name="connsiteX4" fmla="*/ 690849 w 7281316"/>
-              <a:gd name="connsiteY4" fmla="*/ 6842426 h 6858000"/>
-              <a:gd name="connsiteX5" fmla="*/ 335637 w 7281316"/>
-              <a:gd name="connsiteY5" fmla="*/ 94722 h 6858000"/>
-            </a:gdLst>
-            <a:ahLst/>
-            <a:cxnLst>
-              <a:cxn ang="0">
-                <a:pos x="connsiteX0" y="connsiteY0"/>
-              </a:cxn>
-              <a:cxn ang="0">
-                <a:pos x="connsiteX1" y="connsiteY1"/>
-              </a:cxn>
-              <a:cxn ang="0">
-                <a:pos x="connsiteX2" y="connsiteY2"/>
-              </a:cxn>
-              <a:cxn ang="0">
-                <a:pos x="connsiteX3" y="connsiteY3"/>
-              </a:cxn>
-              <a:cxn ang="0">
-                <a:pos x="connsiteX4" y="connsiteY4"/>
-              </a:cxn>
-              <a:cxn ang="0">
-                <a:pos x="connsiteX5" y="connsiteY5"/>
-              </a:cxn>
-            </a:cxnLst>
-            <a:rect l="l" t="t" r="r" b="b"/>
-            <a:pathLst>
-              <a:path w="7281316" h="6858000">
-                <a:moveTo>
-                  <a:pt x="361354" y="0"/>
-                </a:moveTo>
-                <a:lnTo>
-                  <a:pt x="7281316" y="0"/>
-                </a:lnTo>
-                <a:lnTo>
-                  <a:pt x="7281316" y="6858000"/>
-                </a:lnTo>
-                <a:lnTo>
-                  <a:pt x="696735" y="6858000"/>
-                </a:lnTo>
-                <a:lnTo>
-                  <a:pt x="690849" y="6842426"/>
-                </a:lnTo>
-                <a:cubicBezTo>
-                  <a:pt x="-65870" y="4704140"/>
-                  <a:pt x="-226206" y="2374054"/>
-                  <a:pt x="335637" y="94722"/>
-                </a:cubicBezTo>
-                <a:close/>
-              </a:path>
-            </a:pathLst>
-          </a:custGeom>
-          <a:solidFill>
-            <a:schemeClr val="tx1">
-              <a:alpha val="80000"/>
-            </a:schemeClr>
-          </a:solidFill>
-          <a:ln>
-            <a:noFill/>
-          </a:ln>
-        </p:spPr>
-        <p:style>
-          <a:lnRef idx="2">
-            <a:schemeClr val="accent1">
-              <a:shade val="50000"/>
-            </a:schemeClr>
-          </a:lnRef>
-          <a:fillRef idx="1">
-            <a:schemeClr val="accent1"/>
-          </a:fillRef>
-          <a:effectRef idx="0">
-            <a:schemeClr val="accent1"/>
-          </a:effectRef>
-          <a:fontRef idx="minor">
-            <a:schemeClr val="lt1"/>
-          </a:fontRef>
-        </p:style>
-        <p:txBody>
-          <a:bodyPr rtlCol="0" anchor="ctr"/>
-          <a:lstStyle/>
-          <a:p>
-            <a:pPr algn="ctr"/>
-            <a:endParaRPr lang="en-US"/>
-          </a:p>
-        </p:txBody>
-      </p:sp>
-      <p:sp>
-        <p:nvSpPr>
-          <p:cNvPr id="13" name="Freeform: Shape 9">
-            <a:extLst>
-              <a:ext uri="{FF2B5EF4-FFF2-40B4-BE49-F238E27FC236}">
-                <a16:creationId xmlns:a16="http://schemas.microsoft.com/office/drawing/2014/main" id="{89CC0F1E-BAA2-47B1-8F83-7ECB9FD9E009}"/>
-              </a:ext>
-              <a:ext uri="{C183D7F6-B498-43B3-948B-1728B52AA6E4}">
-                <adec:decorative xmlns:adec="http://schemas.microsoft.com/office/drawing/2017/decorative" val="1"/>
-              </a:ext>
-            </a:extLst>
-          </p:cNvPr>
-          <p:cNvSpPr>
-            <a:spLocks noGrp="1" noRot="1" noChangeAspect="1" noMove="1" noResize="1" noEditPoints="1" noAdjustHandles="1" noChangeArrowheads="1" noChangeShapeType="1" noTextEdit="1"/>
-          </p:cNvSpPr>
-          <p:nvPr>
-            <p:extLst>
-              <p:ext uri="{386F3935-93C4-4BCD-93E2-E3B085C9AB24}">
-                <p16:designElem xmlns:p16="http://schemas.microsoft.com/office/powerpoint/2015/main" val="1"/>
-              </p:ext>
-            </p:extLst>
-          </p:nvPr>
-        </p:nvSpPr>
-        <p:spPr>
-          <a:xfrm>
-            <a:off x="5189558" y="0"/>
-            <a:ext cx="6999394" cy="6858000"/>
-          </a:xfrm>
-          <a:custGeom>
-            <a:avLst/>
-            <a:gdLst>
-              <a:gd name="connsiteX0" fmla="*/ 6999394 w 6999394"/>
-              <a:gd name="connsiteY0" fmla="*/ 0 h 6858000"/>
-              <a:gd name="connsiteX1" fmla="*/ 6999394 w 6999394"/>
-              <a:gd name="connsiteY1" fmla="*/ 6858000 h 6858000"/>
-              <a:gd name="connsiteX2" fmla="*/ 717029 w 6999394"/>
-              <a:gd name="connsiteY2" fmla="*/ 6858000 h 6858000"/>
-              <a:gd name="connsiteX3" fmla="*/ 623642 w 6999394"/>
-              <a:gd name="connsiteY3" fmla="*/ 6599363 h 6858000"/>
-              <a:gd name="connsiteX4" fmla="*/ 319533 w 6999394"/>
-              <a:gd name="connsiteY4" fmla="*/ 193787 h 6858000"/>
-              <a:gd name="connsiteX5" fmla="*/ 371685 w 6999394"/>
-              <a:gd name="connsiteY5" fmla="*/ 1 h 6858000"/>
-            </a:gdLst>
-            <a:ahLst/>
-            <a:cxnLst>
-              <a:cxn ang="0">
-                <a:pos x="connsiteX0" y="connsiteY0"/>
-              </a:cxn>
-              <a:cxn ang="0">
-                <a:pos x="connsiteX1" y="connsiteY1"/>
-              </a:cxn>
-              <a:cxn ang="0">
-                <a:pos x="connsiteX2" y="connsiteY2"/>
-              </a:cxn>
-              <a:cxn ang="0">
-                <a:pos x="connsiteX3" y="connsiteY3"/>
-              </a:cxn>
-              <a:cxn ang="0">
-                <a:pos x="connsiteX4" y="connsiteY4"/>
-              </a:cxn>
-              <a:cxn ang="0">
-                <a:pos x="connsiteX5" y="connsiteY5"/>
-              </a:cxn>
-            </a:cxnLst>
-            <a:rect l="l" t="t" r="r" b="b"/>
-            <a:pathLst>
-              <a:path w="6999394" h="6858000">
-                <a:moveTo>
-                  <a:pt x="6999394" y="0"/>
-                </a:moveTo>
-                <a:lnTo>
-                  <a:pt x="6999394" y="6858000"/>
-                </a:lnTo>
-                <a:lnTo>
-                  <a:pt x="717029" y="6858000"/>
-                </a:lnTo>
-                <a:lnTo>
-                  <a:pt x="623642" y="6599363"/>
-                </a:lnTo>
-                <a:cubicBezTo>
-                  <a:pt x="-67685" y="4563346"/>
-                  <a:pt x="-206622" y="2355719"/>
-                  <a:pt x="319533" y="193787"/>
-                </a:cubicBezTo>
-                <a:lnTo>
-                  <a:pt x="371685" y="1"/>
-                </a:lnTo>
-                <a:close/>
-              </a:path>
-            </a:pathLst>
-          </a:custGeom>
-          <a:solidFill>
-            <a:schemeClr val="tx1">
-              <a:alpha val="80000"/>
-            </a:schemeClr>
-          </a:solidFill>
-          <a:ln>
-            <a:noFill/>
-          </a:ln>
-        </p:spPr>
-        <p:style>
-          <a:lnRef idx="2">
-            <a:schemeClr val="accent1">
-              <a:shade val="50000"/>
-            </a:schemeClr>
-          </a:lnRef>
-          <a:fillRef idx="1">
-            <a:schemeClr val="accent1"/>
-          </a:fillRef>
-          <a:effectRef idx="0">
-            <a:schemeClr val="accent1"/>
-          </a:effectRef>
-          <a:fontRef idx="minor">
-            <a:schemeClr val="lt1"/>
-          </a:fontRef>
-        </p:style>
-        <p:txBody>
-          <a:bodyPr rtlCol="0" anchor="ctr"/>
-          <a:lstStyle/>
-          <a:p>
-            <a:pPr algn="ctr"/>
-            <a:endParaRPr lang="en-US"/>
-          </a:p>
-        </p:txBody>
-      </p:sp>
-      <p:sp>
-        <p:nvSpPr>
-          <p:cNvPr id="3" name="Content Placeholder 2">
-            <a:extLst>
-              <a:ext uri="{FF2B5EF4-FFF2-40B4-BE49-F238E27FC236}">
-                <a16:creationId xmlns:a16="http://schemas.microsoft.com/office/drawing/2014/main" id="{3C7C4820-046F-45FD-BFBE-830F7BAA0704}"/>
-              </a:ext>
-            </a:extLst>
-          </p:cNvPr>
-          <p:cNvSpPr>
-            <a:spLocks noGrp="1"/>
-          </p:cNvSpPr>
-          <p:nvPr>
-            <p:ph idx="1"/>
-          </p:nvPr>
-        </p:nvSpPr>
-        <p:spPr>
-          <a:xfrm>
-            <a:off x="6096000" y="1399032"/>
-            <a:ext cx="5501834" cy="4471416"/>
-          </a:xfrm>
-        </p:spPr>
-        <p:txBody>
-          <a:bodyPr anchor="ctr">
-            <a:normAutofit/>
-          </a:bodyPr>
-          <a:lstStyle/>
-          <a:p>
-            <a:r>
-              <a:rPr lang="en-US" sz="2200">
-                <a:solidFill>
-                  <a:schemeClr val="bg1"/>
-                </a:solidFill>
-              </a:rPr>
-              <a:t>Duch, Néstor &amp; Grzybowski, Lukasz &amp; Romahn, André &amp; Verboven, Frank. (2017). “The impact of online sales on consumers and firms. Evidence from consumer electronics”. International Journal of Industrial Organization. 52. 10.1016/j.ijindorg.2017.01.009. </a:t>
-            </a:r>
-          </a:p>
-          <a:p>
-            <a:r>
-              <a:rPr lang="en-GB" sz="2200">
-                <a:solidFill>
-                  <a:schemeClr val="bg1"/>
-                </a:solidFill>
-              </a:rPr>
-              <a:t>Morgan Stanley Research. 2017. ”Alexa, What’s for Dinner Tonight?”</a:t>
-            </a:r>
-            <a:endParaRPr lang="en-US" sz="2200">
-              <a:solidFill>
-                <a:schemeClr val="bg1"/>
-              </a:solidFill>
-            </a:endParaRPr>
-          </a:p>
-        </p:txBody>
-      </p:sp>
-    </p:spTree>
-    <p:extLst>
-      <p:ext uri="{BB962C8B-B14F-4D97-AF65-F5344CB8AC3E}">
-        <p14:creationId xmlns:p14="http://schemas.microsoft.com/office/powerpoint/2010/main" val="3969294392"/>
-      </p:ext>
-    </p:extLst>
-  </p:cSld>
-  <p:clrMapOvr>
-    <a:overrideClrMapping bg1="dk1" tx1="lt1" bg2="dk2" tx2="lt2" accent1="accent1" accent2="accent2" accent3="accent3" accent4="accent4" accent5="accent5" accent6="accent6" hlink="hlink" folHlink="folHlink"/>
-  </p:clrMapOvr>
-</p:sld>
-</file>
-
 <file path=ppt/slides/slide2.xml><?xml version="1.0" encoding="utf-8"?>
 <p:sld xmlns:a="http://schemas.openxmlformats.org/drawingml/2006/main" xmlns:r="http://schemas.openxmlformats.org/officeDocument/2006/relationships" xmlns:p="http://schemas.openxmlformats.org/presentationml/2006/main">
   <p:cSld>
@@ -6625,8 +6326,8 @@
               <a:buNone/>
             </a:pPr>
             <a:r>
-              <a:rPr lang="en-US" sz="1800"/>
-              <a:t>The goal of my project was to identify a modern problem and manufacture a solution to that problem using modern techniques.</a:t>
+              <a:rPr lang="en-US" sz="1800" dirty="0"/>
+              <a:t>The goal of my project was to identify a modern problem and to solve it using modern technologies that interest me.</a:t>
             </a:r>
           </a:p>
         </p:txBody>
@@ -6740,7 +6441,7 @@
             </a:pPr>
             <a:r>
               <a:rPr lang="en-US" sz="1800" dirty="0"/>
-              <a:t>The hospitality sector is undergoing digitalization in the form of online services which allow food outlets to easily advertise and deliver to customers. (Morgan Stanley Research 2017)</a:t>
+              <a:t>With the current global pandemic a lot of services that wouldn’t normally have a need to take reservations now need to, such as barbers and retailers.</a:t>
             </a:r>
           </a:p>
           <a:p>
@@ -6753,22 +6454,14 @@
             </a:pPr>
             <a:r>
               <a:rPr lang="en-US" sz="1800" dirty="0"/>
-              <a:t>This is poised to affect traditional ‘offline’ food-outlets where consumers can dine-out, just as e-commerce has affected other markets (</a:t>
+              <a:t>This has highlighted the fact that there is not many services available for companies to easily and uniformly take bookings. </a:t>
             </a:r>
-            <a:r>
-              <a:rPr lang="en-US" sz="1800" dirty="0" err="1"/>
-              <a:t>Duch</a:t>
-            </a:r>
-            <a:r>
-              <a:rPr lang="en-US" sz="1800" dirty="0"/>
-              <a:t>-Brown et al, 2017)</a:t>
-            </a:r>
-          </a:p>
-        </p:txBody>
-      </p:sp>
-      <p:sp>
-        <p:nvSpPr>
-          <p:cNvPr id="1028" name="Oval 70">
+          </a:p>
+        </p:txBody>
+      </p:sp>
+      <p:sp>
+        <p:nvSpPr>
+          <p:cNvPr id="139" name="Oval 138">
             <a:extLst>
               <a:ext uri="{FF2B5EF4-FFF2-40B4-BE49-F238E27FC236}">
                 <a16:creationId xmlns:a16="http://schemas.microsoft.com/office/drawing/2014/main" id="{C99A8FB7-A79B-4BC9-9D56-B79587F6AA3E}"/>
@@ -6862,7 +6555,7 @@
       </p:sp>
       <p:sp>
         <p:nvSpPr>
-          <p:cNvPr id="1029" name="Oval 72">
+          <p:cNvPr id="141" name="Oval 140">
             <a:extLst>
               <a:ext uri="{FF2B5EF4-FFF2-40B4-BE49-F238E27FC236}">
                 <a16:creationId xmlns:a16="http://schemas.microsoft.com/office/drawing/2014/main" id="{B6114379-CEF2-4927-BEAC-763037C09A9E}"/>
@@ -6954,7 +6647,7 @@
       </p:sp>
       <p:sp>
         <p:nvSpPr>
-          <p:cNvPr id="1030" name="Freeform: Shape 74">
+          <p:cNvPr id="143" name="Freeform: Shape 142">
             <a:extLst>
               <a:ext uri="{FF2B5EF4-FFF2-40B4-BE49-F238E27FC236}">
                 <a16:creationId xmlns:a16="http://schemas.microsoft.com/office/drawing/2014/main" id="{B23893E2-3349-46D7-A7AA-B9E447957FB1}"/>
@@ -7123,7 +6816,7 @@
       </p:sp>
       <p:sp>
         <p:nvSpPr>
-          <p:cNvPr id="77" name="Freeform: Shape 76">
+          <p:cNvPr id="145" name="Freeform: Shape 144">
             <a:extLst>
               <a:ext uri="{FF2B5EF4-FFF2-40B4-BE49-F238E27FC236}">
                 <a16:creationId xmlns:a16="http://schemas.microsoft.com/office/drawing/2014/main" id="{C14C23C8-0D86-4D9E-A9C7-76291675C442}"/>
@@ -7290,10 +6983,10 @@
       </p:sp>
       <p:pic>
         <p:nvPicPr>
-          <p:cNvPr id="6" name="Picture 5" descr="A picture containing logo&#10;&#10;Description automatically generated">
-            <a:extLst>
-              <a:ext uri="{FF2B5EF4-FFF2-40B4-BE49-F238E27FC236}">
-                <a16:creationId xmlns:a16="http://schemas.microsoft.com/office/drawing/2014/main" id="{516BFF4E-3D89-4D34-AD18-2B4C24856538}"/>
+          <p:cNvPr id="8" name="Graphic 7" descr="Car Mechanic">
+            <a:extLst>
+              <a:ext uri="{FF2B5EF4-FFF2-40B4-BE49-F238E27FC236}">
+                <a16:creationId xmlns:a16="http://schemas.microsoft.com/office/drawing/2014/main" id="{1D2931F3-C0CD-4BFD-ABA0-188BD46444A0}"/>
               </a:ext>
             </a:extLst>
           </p:cNvPr>
@@ -7308,6 +7001,9 @@
               <a:ext uri="{28A0092B-C50C-407E-A947-70E740481C1C}">
                 <a14:useLocalDpi xmlns:a14="http://schemas.microsoft.com/office/drawing/2010/main" val="0"/>
               </a:ext>
+              <a:ext uri="{96DAC541-7B7A-43D3-8B79-37D633B846F1}">
+                <asvg:svgBlip xmlns:asvg="http://schemas.microsoft.com/office/drawing/2016/SVG/main" r:embed="rId4"/>
+              </a:ext>
             </a:extLst>
           </a:blip>
           <a:stretch>
@@ -7316,8 +7012,8 @@
         </p:blipFill>
         <p:spPr>
           <a:xfrm>
-            <a:off x="8850774" y="614609"/>
-            <a:ext cx="3028386" cy="1718609"/>
+            <a:off x="9188245" y="297192"/>
+            <a:ext cx="2353443" cy="2353443"/>
           </a:xfrm>
           <a:prstGeom prst="rect">
             <a:avLst/>
@@ -7326,53 +7022,45 @@
       </p:pic>
       <p:pic>
         <p:nvPicPr>
-          <p:cNvPr id="1026" name="Picture 2" descr="Just Eat Logo PNG Transparent &amp; SVG Vector - Freebie Supply">
-            <a:extLst>
-              <a:ext uri="{FF2B5EF4-FFF2-40B4-BE49-F238E27FC236}">
-                <a16:creationId xmlns:a16="http://schemas.microsoft.com/office/drawing/2014/main" id="{6666D232-2EEA-4067-B925-515BDC229D1E}"/>
+          <p:cNvPr id="5" name="Graphic 4" descr="Hammer">
+            <a:extLst>
+              <a:ext uri="{FF2B5EF4-FFF2-40B4-BE49-F238E27FC236}">
+                <a16:creationId xmlns:a16="http://schemas.microsoft.com/office/drawing/2014/main" id="{CC0B8D3D-1463-45A9-9B5E-ED7B89044E52}"/>
               </a:ext>
             </a:extLst>
           </p:cNvPr>
           <p:cNvPicPr>
-            <a:picLocks noChangeAspect="1" noChangeArrowheads="1"/>
+            <a:picLocks noChangeAspect="1"/>
           </p:cNvPicPr>
           <p:nvPr/>
         </p:nvPicPr>
         <p:blipFill>
-          <a:blip r:embed="rId4">
+          <a:blip r:embed="rId5">
             <a:extLst>
               <a:ext uri="{28A0092B-C50C-407E-A947-70E740481C1C}">
                 <a14:useLocalDpi xmlns:a14="http://schemas.microsoft.com/office/drawing/2010/main" val="0"/>
               </a:ext>
+              <a:ext uri="{96DAC541-7B7A-43D3-8B79-37D633B846F1}">
+                <asvg:svgBlip xmlns:asvg="http://schemas.microsoft.com/office/drawing/2016/SVG/main" r:embed="rId6"/>
+              </a:ext>
             </a:extLst>
           </a:blip>
-          <a:stretch>
-            <a:fillRect/>
-          </a:stretch>
+          <a:srcRect/>
+          <a:stretch/>
         </p:blipFill>
-        <p:spPr bwMode="auto">
+        <p:spPr>
           <a:xfrm>
-            <a:off x="6369366" y="3603460"/>
-            <a:ext cx="1741359" cy="1306019"/>
+            <a:off x="6369366" y="3385790"/>
+            <a:ext cx="1344555" cy="1344555"/>
           </a:xfrm>
           <a:prstGeom prst="rect">
             <a:avLst/>
           </a:prstGeom>
-          <a:noFill/>
-          <a:extLst>
-            <a:ext uri="{909E8E84-426E-40DD-AFC4-6F175D3DCCD1}">
-              <a14:hiddenFill xmlns:a14="http://schemas.microsoft.com/office/drawing/2010/main">
-                <a:solidFill>
-                  <a:srgbClr val="FFFFFF"/>
-                </a:solidFill>
-              </a14:hiddenFill>
-            </a:ext>
-          </a:extLst>
         </p:spPr>
       </p:pic>
       <p:sp>
         <p:nvSpPr>
-          <p:cNvPr id="79" name="Freeform: Shape 78">
+          <p:cNvPr id="147" name="Freeform: Shape 146">
             <a:extLst>
               <a:ext uri="{FF2B5EF4-FFF2-40B4-BE49-F238E27FC236}">
                 <a16:creationId xmlns:a16="http://schemas.microsoft.com/office/drawing/2014/main" id="{2B7592FE-10D1-4664-B623-353F47C8DF7F}"/>
@@ -7549,7 +7237,7 @@
       </p:sp>
       <p:sp>
         <p:nvSpPr>
-          <p:cNvPr id="81" name="Freeform: Shape 80">
+          <p:cNvPr id="149" name="Freeform: Shape 148">
             <a:extLst>
               <a:ext uri="{FF2B5EF4-FFF2-40B4-BE49-F238E27FC236}">
                 <a16:creationId xmlns:a16="http://schemas.microsoft.com/office/drawing/2014/main" id="{32248578-C6EF-47FB-8B88-AD65C27452B1}"/>
@@ -7724,10 +7412,10 @@
       </p:sp>
       <p:pic>
         <p:nvPicPr>
-          <p:cNvPr id="15" name="Picture 14">
-            <a:extLst>
-              <a:ext uri="{FF2B5EF4-FFF2-40B4-BE49-F238E27FC236}">
-                <a16:creationId xmlns:a16="http://schemas.microsoft.com/office/drawing/2014/main" id="{B153A475-C73C-4874-AAE1-A3597E7331A5}"/>
+          <p:cNvPr id="10" name="Graphic 9" descr="Salon">
+            <a:extLst>
+              <a:ext uri="{FF2B5EF4-FFF2-40B4-BE49-F238E27FC236}">
+                <a16:creationId xmlns:a16="http://schemas.microsoft.com/office/drawing/2014/main" id="{66E57A0C-1EDE-49DE-84B4-AECDCA044B62}"/>
               </a:ext>
             </a:extLst>
           </p:cNvPr>
@@ -7737,10 +7425,13 @@
           <p:nvPr/>
         </p:nvPicPr>
         <p:blipFill>
-          <a:blip r:embed="rId5">
+          <a:blip r:embed="rId7">
             <a:extLst>
               <a:ext uri="{28A0092B-C50C-407E-A947-70E740481C1C}">
                 <a14:useLocalDpi xmlns:a14="http://schemas.microsoft.com/office/drawing/2010/main" val="0"/>
+              </a:ext>
+              <a:ext uri="{96DAC541-7B7A-43D3-8B79-37D633B846F1}">
+                <asvg:svgBlip xmlns:asvg="http://schemas.microsoft.com/office/drawing/2016/SVG/main" r:embed="rId8"/>
               </a:ext>
             </a:extLst>
           </a:blip>
@@ -7750,8 +7441,47 @@
         </p:blipFill>
         <p:spPr>
           <a:xfrm>
-            <a:off x="9582150" y="5643925"/>
-            <a:ext cx="2407535" cy="252791"/>
+            <a:off x="9873347" y="4857750"/>
+            <a:ext cx="1825141" cy="1825141"/>
+          </a:xfrm>
+          <a:prstGeom prst="rect">
+            <a:avLst/>
+          </a:prstGeom>
+        </p:spPr>
+      </p:pic>
+      <p:pic>
+        <p:nvPicPr>
+          <p:cNvPr id="14" name="Graphic 13" descr="Nails">
+            <a:extLst>
+              <a:ext uri="{FF2B5EF4-FFF2-40B4-BE49-F238E27FC236}">
+                <a16:creationId xmlns:a16="http://schemas.microsoft.com/office/drawing/2014/main" id="{4821B28B-42A4-4EAC-B221-B396698A2D48}"/>
+              </a:ext>
+            </a:extLst>
+          </p:cNvPr>
+          <p:cNvPicPr>
+            <a:picLocks noChangeAspect="1"/>
+          </p:cNvPicPr>
+          <p:nvPr/>
+        </p:nvPicPr>
+        <p:blipFill>
+          <a:blip r:embed="rId9">
+            <a:extLst>
+              <a:ext uri="{28A0092B-C50C-407E-A947-70E740481C1C}">
+                <a14:useLocalDpi xmlns:a14="http://schemas.microsoft.com/office/drawing/2010/main" val="0"/>
+              </a:ext>
+              <a:ext uri="{96DAC541-7B7A-43D3-8B79-37D633B846F1}">
+                <asvg:svgBlip xmlns:asvg="http://schemas.microsoft.com/office/drawing/2016/SVG/main" r:embed="rId10"/>
+              </a:ext>
+            </a:extLst>
+          </a:blip>
+          <a:stretch>
+            <a:fillRect/>
+          </a:stretch>
+        </p:blipFill>
+        <p:spPr>
+          <a:xfrm>
+            <a:off x="6982089" y="4120116"/>
+            <a:ext cx="914400" cy="914400"/>
           </a:xfrm>
           <a:prstGeom prst="rect">
             <a:avLst/>
@@ -7874,7 +7604,22 @@
             </a:pPr>
             <a:r>
               <a:rPr lang="en-US" sz="1800" dirty="0"/>
-              <a:t>Take advantage of the digitalization of the market to provide an online platform for traditional brick and mortar restaurants to advertise to and take bookings from potential customers</a:t>
+              <a:t>Create on online marketplace for businesses and tradesmen to advertise their services and take bookings from potential customers easily. </a:t>
+            </a:r>
+          </a:p>
+          <a:p>
+            <a:pPr marL="0" indent="0">
+              <a:buNone/>
+            </a:pPr>
+            <a:endParaRPr lang="en-US" sz="1800" dirty="0"/>
+          </a:p>
+          <a:p>
+            <a:pPr marL="0" indent="0">
+              <a:buNone/>
+            </a:pPr>
+            <a:r>
+              <a:rPr lang="en-US" sz="1800" dirty="0"/>
+              <a:t>The ‘marketplace’ would tailor search results for a user dependent on their location and needs.</a:t>
             </a:r>
           </a:p>
         </p:txBody>
@@ -8283,10 +8028,10 @@
       </p:sp>
       <p:pic>
         <p:nvPicPr>
-          <p:cNvPr id="25" name="Graphic 24" descr="Waiter">
-            <a:extLst>
-              <a:ext uri="{FF2B5EF4-FFF2-40B4-BE49-F238E27FC236}">
-                <a16:creationId xmlns:a16="http://schemas.microsoft.com/office/drawing/2014/main" id="{17780AC6-CD86-45A8-A7C2-F2D89809A788}"/>
+          <p:cNvPr id="5" name="Graphic 4" descr="Kiosk">
+            <a:extLst>
+              <a:ext uri="{FF2B5EF4-FFF2-40B4-BE49-F238E27FC236}">
+                <a16:creationId xmlns:a16="http://schemas.microsoft.com/office/drawing/2014/main" id="{CA613155-DAB5-4184-8785-71653F591F1F}"/>
               </a:ext>
             </a:extLst>
           </p:cNvPr>
@@ -8312,8 +8057,8 @@
         </p:blipFill>
         <p:spPr>
           <a:xfrm>
-            <a:off x="7999956" y="1456268"/>
-            <a:ext cx="3945463" cy="3945463"/>
+            <a:off x="8431619" y="2085142"/>
+            <a:ext cx="3252550" cy="3252550"/>
           </a:xfrm>
           <a:prstGeom prst="rect">
             <a:avLst/>
@@ -8387,7 +8132,7 @@
           <a:lstStyle/>
           <a:p>
             <a:r>
-              <a:rPr lang="en-US"/>
+              <a:rPr lang="en-US" dirty="0"/>
               <a:t>System Overview</a:t>
             </a:r>
           </a:p>
@@ -8760,7 +8505,7 @@
         </p:blipFill>
         <p:spPr>
           <a:xfrm>
-            <a:off x="569581" y="253467"/>
+            <a:off x="569581" y="195593"/>
             <a:ext cx="2285643" cy="2285643"/>
           </a:xfrm>
           <a:prstGeom prst="rect">
@@ -9640,7 +9385,7 @@
             </a:pPr>
             <a:r>
               <a:rPr lang="en-US" sz="1800" dirty="0"/>
-              <a:t>A platform that will allow restaurants to advertise their menu and venue via a website or mobile application. </a:t>
+              <a:t>A platform that will allow businesses to advertise their services and availability via a website or mobile application. </a:t>
             </a:r>
           </a:p>
           <a:p>
@@ -9655,7 +9400,7 @@
             </a:pPr>
             <a:r>
               <a:rPr lang="en-US" sz="1800" dirty="0"/>
-              <a:t>The service will also allow restaurants to take reservations from customers and allow pre-ordering of meals for a quicker service on arrival.</a:t>
+              <a:t>The service will also allow businesses to take bookings from customers and allow for pre-payment of some services </a:t>
             </a:r>
           </a:p>
         </p:txBody>
@@ -10817,10 +10562,7 @@
     <p:bg>
       <p:bgPr>
         <a:solidFill>
-          <a:schemeClr val="bg1">
-            <a:tint val="95000"/>
-            <a:satMod val="170000"/>
-          </a:schemeClr>
+          <a:schemeClr val="bg1"/>
         </a:solidFill>
         <a:effectLst/>
       </p:bgPr>
@@ -10839,47 +10581,12 @@
           <a:chExt cx="0" cy="0"/>
         </a:xfrm>
       </p:grpSpPr>
-      <p:sp>
-        <p:nvSpPr>
-          <p:cNvPr id="2" name="Title 1">
-            <a:extLst>
-              <a:ext uri="{FF2B5EF4-FFF2-40B4-BE49-F238E27FC236}">
-                <a16:creationId xmlns:a16="http://schemas.microsoft.com/office/drawing/2014/main" id="{DB901D75-B526-41CE-BE75-08BA020E8C3A}"/>
-              </a:ext>
-            </a:extLst>
-          </p:cNvPr>
-          <p:cNvSpPr>
-            <a:spLocks noGrp="1"/>
-          </p:cNvSpPr>
-          <p:nvPr>
-            <p:ph type="title"/>
-          </p:nvPr>
-        </p:nvSpPr>
-        <p:spPr>
-          <a:xfrm>
-            <a:off x="804673" y="1445494"/>
-            <a:ext cx="3616856" cy="4376572"/>
-          </a:xfrm>
-        </p:spPr>
-        <p:txBody>
-          <a:bodyPr anchor="ctr">
-            <a:normAutofit/>
-          </a:bodyPr>
-          <a:lstStyle/>
-          <a:p>
-            <a:r>
-              <a:rPr lang="en-US" sz="4800"/>
-              <a:t>Timeline</a:t>
-            </a:r>
-          </a:p>
-        </p:txBody>
-      </p:sp>
-      <p:sp>
-        <p:nvSpPr>
-          <p:cNvPr id="8" name="Freeform: Shape 7">
-            <a:extLst>
-              <a:ext uri="{FF2B5EF4-FFF2-40B4-BE49-F238E27FC236}">
-                <a16:creationId xmlns:a16="http://schemas.microsoft.com/office/drawing/2014/main" id="{DFF2AC85-FAA0-4844-813F-83C04D7382E2}"/>
+      <p:sp useBgFill="1">
+        <p:nvSpPr>
+          <p:cNvPr id="53" name="Rectangle 52">
+            <a:extLst>
+              <a:ext uri="{FF2B5EF4-FFF2-40B4-BE49-F238E27FC236}">
+                <a16:creationId xmlns:a16="http://schemas.microsoft.com/office/drawing/2014/main" id="{3A930249-8242-4E2B-AF17-C01826488321}"/>
               </a:ext>
               <a:ext uri="{C183D7F6-B498-43B3-948B-1728B52AA6E4}">
                 <adec:decorative xmlns:adec="http://schemas.microsoft.com/office/drawing/2017/decorative" val="1"/>
@@ -10899,77 +10606,74 @@
         </p:nvSpPr>
         <p:spPr>
           <a:xfrm>
-            <a:off x="4907636" y="0"/>
-            <a:ext cx="7281316" cy="6858000"/>
+            <a:off x="-1" y="0"/>
+            <a:ext cx="12188952" cy="6858000"/>
           </a:xfrm>
-          <a:custGeom>
+          <a:prstGeom prst="rect">
             <a:avLst/>
-            <a:gdLst>
-              <a:gd name="connsiteX0" fmla="*/ 361354 w 7281316"/>
-              <a:gd name="connsiteY0" fmla="*/ 0 h 6858000"/>
-              <a:gd name="connsiteX1" fmla="*/ 7281316 w 7281316"/>
-              <a:gd name="connsiteY1" fmla="*/ 0 h 6858000"/>
-              <a:gd name="connsiteX2" fmla="*/ 7281316 w 7281316"/>
-              <a:gd name="connsiteY2" fmla="*/ 6858000 h 6858000"/>
-              <a:gd name="connsiteX3" fmla="*/ 696735 w 7281316"/>
-              <a:gd name="connsiteY3" fmla="*/ 6858000 h 6858000"/>
-              <a:gd name="connsiteX4" fmla="*/ 690849 w 7281316"/>
-              <a:gd name="connsiteY4" fmla="*/ 6842426 h 6858000"/>
-              <a:gd name="connsiteX5" fmla="*/ 335637 w 7281316"/>
-              <a:gd name="connsiteY5" fmla="*/ 94722 h 6858000"/>
-            </a:gdLst>
-            <a:ahLst/>
-            <a:cxnLst>
-              <a:cxn ang="0">
-                <a:pos x="connsiteX0" y="connsiteY0"/>
-              </a:cxn>
-              <a:cxn ang="0">
-                <a:pos x="connsiteX1" y="connsiteY1"/>
-              </a:cxn>
-              <a:cxn ang="0">
-                <a:pos x="connsiteX2" y="connsiteY2"/>
-              </a:cxn>
-              <a:cxn ang="0">
-                <a:pos x="connsiteX3" y="connsiteY3"/>
-              </a:cxn>
-              <a:cxn ang="0">
-                <a:pos x="connsiteX4" y="connsiteY4"/>
-              </a:cxn>
-              <a:cxn ang="0">
-                <a:pos x="connsiteX5" y="connsiteY5"/>
-              </a:cxn>
-            </a:cxnLst>
-            <a:rect l="l" t="t" r="r" b="b"/>
-            <a:pathLst>
-              <a:path w="7281316" h="6858000">
-                <a:moveTo>
-                  <a:pt x="361354" y="0"/>
-                </a:moveTo>
-                <a:lnTo>
-                  <a:pt x="7281316" y="0"/>
-                </a:lnTo>
-                <a:lnTo>
-                  <a:pt x="7281316" y="6858000"/>
-                </a:lnTo>
-                <a:lnTo>
-                  <a:pt x="696735" y="6858000"/>
-                </a:lnTo>
-                <a:lnTo>
-                  <a:pt x="690849" y="6842426"/>
-                </a:lnTo>
-                <a:cubicBezTo>
-                  <a:pt x="-65870" y="4704140"/>
-                  <a:pt x="-226206" y="2374054"/>
-                  <a:pt x="335637" y="94722"/>
-                </a:cubicBezTo>
-                <a:close/>
-              </a:path>
-            </a:pathLst>
-          </a:custGeom>
+          </a:prstGeom>
+          <a:ln>
+            <a:noFill/>
+          </a:ln>
+        </p:spPr>
+        <p:style>
+          <a:lnRef idx="2">
+            <a:schemeClr val="accent1">
+              <a:shade val="50000"/>
+            </a:schemeClr>
+          </a:lnRef>
+          <a:fillRef idx="1">
+            <a:schemeClr val="accent1"/>
+          </a:fillRef>
+          <a:effectRef idx="0">
+            <a:schemeClr val="accent1"/>
+          </a:effectRef>
+          <a:fontRef idx="minor">
+            <a:schemeClr val="lt1"/>
+          </a:fontRef>
+        </p:style>
+        <p:txBody>
+          <a:bodyPr rtlCol="0" anchor="ctr"/>
+          <a:lstStyle/>
+          <a:p>
+            <a:pPr algn="ctr"/>
+            <a:endParaRPr lang="en-US"/>
+          </a:p>
+        </p:txBody>
+      </p:sp>
+      <p:sp>
+        <p:nvSpPr>
+          <p:cNvPr id="55" name="Rectangle 54">
+            <a:extLst>
+              <a:ext uri="{FF2B5EF4-FFF2-40B4-BE49-F238E27FC236}">
+                <a16:creationId xmlns:a16="http://schemas.microsoft.com/office/drawing/2014/main" id="{A5BDD999-C5E1-4B3E-A710-768673819165}"/>
+              </a:ext>
+              <a:ext uri="{C183D7F6-B498-43B3-948B-1728B52AA6E4}">
+                <adec:decorative xmlns:adec="http://schemas.microsoft.com/office/drawing/2017/decorative" val="1"/>
+              </a:ext>
+            </a:extLst>
+          </p:cNvPr>
+          <p:cNvSpPr>
+            <a:spLocks noGrp="1" noRot="1" noChangeAspect="1" noMove="1" noResize="1" noEditPoints="1" noAdjustHandles="1" noChangeArrowheads="1" noChangeShapeType="1" noTextEdit="1"/>
+          </p:cNvSpPr>
+          <p:nvPr>
+            <p:extLst>
+              <p:ext uri="{386F3935-93C4-4BCD-93E2-E3B085C9AB24}">
+                <p16:designElem xmlns:p16="http://schemas.microsoft.com/office/powerpoint/2015/main" val="1"/>
+              </p:ext>
+            </p:extLst>
+          </p:nvPr>
+        </p:nvSpPr>
+        <p:spPr>
+          <a:xfrm>
+            <a:off x="187388" y="181576"/>
+            <a:ext cx="11823637" cy="6501088"/>
+          </a:xfrm>
+          <a:prstGeom prst="rect">
+            <a:avLst/>
+          </a:prstGeom>
           <a:solidFill>
-            <a:schemeClr val="tx1">
-              <a:alpha val="80000"/>
-            </a:schemeClr>
+            <a:srgbClr val="FFFFFF"/>
           </a:solidFill>
           <a:ln>
             <a:noFill/>
@@ -10996,109 +10700,85 @@
           <a:lstStyle/>
           <a:p>
             <a:pPr algn="ctr"/>
-            <a:endParaRPr lang="en-US"/>
-          </a:p>
-        </p:txBody>
-      </p:sp>
-      <p:sp>
-        <p:nvSpPr>
-          <p:cNvPr id="10" name="Freeform: Shape 9">
-            <a:extLst>
-              <a:ext uri="{FF2B5EF4-FFF2-40B4-BE49-F238E27FC236}">
-                <a16:creationId xmlns:a16="http://schemas.microsoft.com/office/drawing/2014/main" id="{89CC0F1E-BAA2-47B1-8F83-7ECB9FD9E009}"/>
-              </a:ext>
-              <a:ext uri="{C183D7F6-B498-43B3-948B-1728B52AA6E4}">
-                <adec:decorative xmlns:adec="http://schemas.microsoft.com/office/drawing/2017/decorative" val="1"/>
-              </a:ext>
-            </a:extLst>
-          </p:cNvPr>
-          <p:cNvSpPr>
-            <a:spLocks noGrp="1" noRot="1" noChangeAspect="1" noMove="1" noResize="1" noEditPoints="1" noAdjustHandles="1" noChangeArrowheads="1" noChangeShapeType="1" noTextEdit="1"/>
-          </p:cNvSpPr>
-          <p:nvPr>
-            <p:extLst>
-              <p:ext uri="{386F3935-93C4-4BCD-93E2-E3B085C9AB24}">
-                <p16:designElem xmlns:p16="http://schemas.microsoft.com/office/powerpoint/2015/main" val="1"/>
-              </p:ext>
-            </p:extLst>
-          </p:nvPr>
-        </p:nvSpPr>
+            <a:endParaRPr lang="en-US">
+              <a:solidFill>
+                <a:srgbClr val="000000"/>
+              </a:solidFill>
+            </a:endParaRPr>
+          </a:p>
+        </p:txBody>
+      </p:sp>
+      <p:pic>
+        <p:nvPicPr>
+          <p:cNvPr id="5" name="Content Placeholder 4" descr="Graphical user interface, application, table&#10;&#10;Description automatically generated">
+            <a:extLst>
+              <a:ext uri="{FF2B5EF4-FFF2-40B4-BE49-F238E27FC236}">
+                <a16:creationId xmlns:a16="http://schemas.microsoft.com/office/drawing/2014/main" id="{E5A5ED15-F5EC-4B7B-9CB1-FF2FFFC6B59F}"/>
+              </a:ext>
+            </a:extLst>
+          </p:cNvPr>
+          <p:cNvPicPr>
+            <a:picLocks noGrp="1" noChangeAspect="1"/>
+          </p:cNvPicPr>
+          <p:nvPr>
+            <p:ph idx="1"/>
+          </p:nvPr>
+        </p:nvPicPr>
+        <p:blipFill rotWithShape="1">
+          <a:blip r:embed="rId3">
+            <a:alphaModFix amt="80000"/>
+            <a:extLst>
+              <a:ext uri="{28A0092B-C50C-407E-A947-70E740481C1C}">
+                <a14:useLocalDpi xmlns:a14="http://schemas.microsoft.com/office/drawing/2010/main" val="0"/>
+              </a:ext>
+            </a:extLst>
+          </a:blip>
+          <a:srcRect r="-1" b="2277"/>
+          <a:stretch/>
+        </p:blipFill>
         <p:spPr>
           <a:xfrm>
-            <a:off x="5189558" y="0"/>
-            <a:ext cx="6999394" cy="6858000"/>
+            <a:off x="0" y="1"/>
+            <a:ext cx="12298525" cy="6857999"/>
           </a:xfrm>
-          <a:custGeom>
+          <a:prstGeom prst="rect">
             <a:avLst/>
-            <a:gdLst>
-              <a:gd name="connsiteX0" fmla="*/ 6999394 w 6999394"/>
-              <a:gd name="connsiteY0" fmla="*/ 0 h 6858000"/>
-              <a:gd name="connsiteX1" fmla="*/ 6999394 w 6999394"/>
-              <a:gd name="connsiteY1" fmla="*/ 6858000 h 6858000"/>
-              <a:gd name="connsiteX2" fmla="*/ 717029 w 6999394"/>
-              <a:gd name="connsiteY2" fmla="*/ 6858000 h 6858000"/>
-              <a:gd name="connsiteX3" fmla="*/ 623642 w 6999394"/>
-              <a:gd name="connsiteY3" fmla="*/ 6599363 h 6858000"/>
-              <a:gd name="connsiteX4" fmla="*/ 319533 w 6999394"/>
-              <a:gd name="connsiteY4" fmla="*/ 193787 h 6858000"/>
-              <a:gd name="connsiteX5" fmla="*/ 371685 w 6999394"/>
-              <a:gd name="connsiteY5" fmla="*/ 1 h 6858000"/>
-            </a:gdLst>
-            <a:ahLst/>
-            <a:cxnLst>
-              <a:cxn ang="0">
-                <a:pos x="connsiteX0" y="connsiteY0"/>
-              </a:cxn>
-              <a:cxn ang="0">
-                <a:pos x="connsiteX1" y="connsiteY1"/>
-              </a:cxn>
-              <a:cxn ang="0">
-                <a:pos x="connsiteX2" y="connsiteY2"/>
-              </a:cxn>
-              <a:cxn ang="0">
-                <a:pos x="connsiteX3" y="connsiteY3"/>
-              </a:cxn>
-              <a:cxn ang="0">
-                <a:pos x="connsiteX4" y="connsiteY4"/>
-              </a:cxn>
-              <a:cxn ang="0">
-                <a:pos x="connsiteX5" y="connsiteY5"/>
-              </a:cxn>
-            </a:cxnLst>
-            <a:rect l="l" t="t" r="r" b="b"/>
-            <a:pathLst>
-              <a:path w="6999394" h="6858000">
-                <a:moveTo>
-                  <a:pt x="6999394" y="0"/>
-                </a:moveTo>
-                <a:lnTo>
-                  <a:pt x="6999394" y="6858000"/>
-                </a:lnTo>
-                <a:lnTo>
-                  <a:pt x="717029" y="6858000"/>
-                </a:lnTo>
-                <a:lnTo>
-                  <a:pt x="623642" y="6599363"/>
-                </a:lnTo>
-                <a:cubicBezTo>
-                  <a:pt x="-67685" y="4563346"/>
-                  <a:pt x="-206622" y="2355719"/>
-                  <a:pt x="319533" y="193787"/>
-                </a:cubicBezTo>
-                <a:lnTo>
-                  <a:pt x="371685" y="1"/>
-                </a:lnTo>
-                <a:close/>
-              </a:path>
-            </a:pathLst>
-          </a:custGeom>
+          </a:prstGeom>
+        </p:spPr>
+      </p:pic>
+      <p:sp>
+        <p:nvSpPr>
+          <p:cNvPr id="3" name="Oval 2">
+            <a:extLst>
+              <a:ext uri="{FF2B5EF4-FFF2-40B4-BE49-F238E27FC236}">
+                <a16:creationId xmlns:a16="http://schemas.microsoft.com/office/drawing/2014/main" id="{08BE0F8A-C7EE-4BCE-9D3E-DDA153DEE59B}"/>
+              </a:ext>
+            </a:extLst>
+          </p:cNvPr>
+          <p:cNvSpPr/>
+          <p:nvPr/>
+        </p:nvSpPr>
+        <p:spPr>
+          <a:xfrm>
+            <a:off x="6655981" y="-1323754"/>
+            <a:ext cx="7277986" cy="8851605"/>
+          </a:xfrm>
+          <a:prstGeom prst="ellipse">
+            <a:avLst/>
+          </a:prstGeom>
           <a:solidFill>
             <a:schemeClr val="tx1">
-              <a:alpha val="80000"/>
+              <a:lumMod val="65000"/>
+              <a:lumOff val="35000"/>
             </a:schemeClr>
           </a:solidFill>
-          <a:ln>
-            <a:noFill/>
+          <a:ln w="139700">
+            <a:solidFill>
+              <a:schemeClr val="tx1">
+                <a:lumMod val="50000"/>
+                <a:lumOff val="50000"/>
+              </a:schemeClr>
+            </a:solidFill>
           </a:ln>
         </p:spPr>
         <p:style>
@@ -11126,40 +10806,45 @@
           </a:p>
         </p:txBody>
       </p:sp>
-      <p:pic>
-        <p:nvPicPr>
-          <p:cNvPr id="5" name="Content Placeholder 4" descr="Graphical user interface, application, table&#10;&#10;Description automatically generated">
-            <a:extLst>
-              <a:ext uri="{FF2B5EF4-FFF2-40B4-BE49-F238E27FC236}">
-                <a16:creationId xmlns:a16="http://schemas.microsoft.com/office/drawing/2014/main" id="{E5A5ED15-F5EC-4B7B-9CB1-FF2FFFC6B59F}"/>
-              </a:ext>
-            </a:extLst>
-          </p:cNvPr>
-          <p:cNvPicPr>
-            <a:picLocks noGrp="1" noChangeAspect="1"/>
-          </p:cNvPicPr>
-          <p:nvPr>
-            <p:ph idx="1"/>
-          </p:nvPr>
-        </p:nvPicPr>
-        <p:blipFill rotWithShape="1">
-          <a:blip r:embed="rId2">
-            <a:extLst>
-              <a:ext uri="{28A0092B-C50C-407E-A947-70E740481C1C}">
-                <a14:useLocalDpi xmlns:a14="http://schemas.microsoft.com/office/drawing/2010/main" val="0"/>
-              </a:ext>
-            </a:extLst>
-          </a:blip>
-          <a:srcRect r="30210"/>
-          <a:stretch/>
-        </p:blipFill>
+      <p:sp>
+        <p:nvSpPr>
+          <p:cNvPr id="2" name="Title 1">
+            <a:extLst>
+              <a:ext uri="{FF2B5EF4-FFF2-40B4-BE49-F238E27FC236}">
+                <a16:creationId xmlns:a16="http://schemas.microsoft.com/office/drawing/2014/main" id="{DB901D75-B526-41CE-BE75-08BA020E8C3A}"/>
+              </a:ext>
+            </a:extLst>
+          </p:cNvPr>
+          <p:cNvSpPr>
+            <a:spLocks noGrp="1"/>
+          </p:cNvSpPr>
+          <p:nvPr>
+            <p:ph type="title"/>
+          </p:nvPr>
+        </p:nvSpPr>
         <p:spPr>
           <a:xfrm>
-            <a:off x="3683361" y="2632"/>
-            <a:ext cx="8505592" cy="6855368"/>
+            <a:off x="8208000" y="2783338"/>
+            <a:ext cx="2688019" cy="723912"/>
           </a:xfrm>
         </p:spPr>
-      </p:pic>
+        <p:txBody>
+          <a:bodyPr vert="horz" lIns="91440" tIns="45720" rIns="91440" bIns="45720" rtlCol="0" anchor="ctr" anchorCtr="0">
+            <a:normAutofit fontScale="90000"/>
+          </a:bodyPr>
+          <a:lstStyle/>
+          <a:p>
+            <a:r>
+              <a:rPr lang="en-US" sz="5200" dirty="0">
+                <a:solidFill>
+                  <a:schemeClr val="bg1"/>
+                </a:solidFill>
+              </a:rPr>
+              <a:t>Timeline</a:t>
+            </a:r>
+          </a:p>
+        </p:txBody>
+      </p:sp>
     </p:spTree>
     <p:extLst>
       <p:ext uri="{BB962C8B-B14F-4D97-AF65-F5344CB8AC3E}">
@@ -11168,7 +10853,7 @@
     </p:extLst>
   </p:cSld>
   <p:clrMapOvr>
-    <a:overrideClrMapping bg1="dk1" tx1="lt1" bg2="dk2" tx2="lt2" accent1="accent1" accent2="accent2" accent3="accent3" accent4="accent4" accent5="accent5" accent6="accent6" hlink="hlink" folHlink="folHlink"/>
+    <a:masterClrMapping/>
   </p:clrMapOvr>
 </p:sld>
 </file>

</xml_diff>

<commit_message>
#14 #20 #21 #22 #23
All the work completed across the Christmas break:
- Architecture revsion
- Initial Venue creation
- Partner creation / Login
</commit_message>
<xml_diff>
--- a/Resources/Project Demo 1.pptx
+++ b/Resources/Project Demo 1.pptx
@@ -224,7 +224,7 @@
           <a:p>
             <a:fld id="{73B2889B-A0AC-4482-8592-5C96F2309420}" type="datetimeFigureOut">
               <a:rPr lang="en-US" smtClean="0"/>
-              <a:t>11/21/2020</a:t>
+              <a:t>12/1/2020</a:t>
             </a:fld>
             <a:endParaRPr lang="en-US"/>
           </a:p>
@@ -401,7 +401,7 @@
           <a:p>
             <a:fld id="{830EB223-FFC0-462A-A3B8-EAA7CE0F8CBD}" type="datetimeFigureOut">
               <a:rPr lang="en-US" smtClean="0"/>
-              <a:t>11/21/2020</a:t>
+              <a:t>12/1/2020</a:t>
             </a:fld>
             <a:endParaRPr lang="en-US" dirty="0"/>
           </a:p>
@@ -885,7 +885,7 @@
           <a:p>
             <a:r>
               <a:rPr lang="en-US" dirty="0"/>
-              <a:t>The problem I identified and decided to tackle is that there is no uniform or standard way for businesses to take reservations from there customers. Many companies resort to using various messenger services or in some cases making dedicated apps or websites.</a:t>
+              <a:t>The problem I identified and decided to tackle is that there is no uniform or standard way for businesses to take reservations from there potential customers. Many companies resort to using various messenger services or in some cases making dedicated apps or websites, which do not get the traffic needed to justify their creation.</a:t>
             </a:r>
           </a:p>
         </p:txBody>
@@ -1071,7 +1071,7 @@
           <a:p>
             <a:r>
               <a:rPr lang="en-US" dirty="0"/>
-              <a:t>Once they find a business they like, they will be able to make a reservation at an available time and pre-pay for services with set prices.</a:t>
+              <a:t>Once they find a business they like, they will be able to make a reservation at an available time and potentially pay for their services in advance.</a:t>
             </a:r>
           </a:p>
         </p:txBody>
@@ -1201,7 +1201,7 @@
             </a:pPr>
             <a:r>
               <a:rPr lang="en-US" sz="2000" dirty="0"/>
-              <a:t>The User a represented in the PRESENTATION layer will interact with either the mobile app or web client which will be run in a docker container on AWS. </a:t>
+              <a:t>The User will view the PRESENTATION layer  with either the mobile app or the web client which will be run in a docker container on AWS. </a:t>
             </a:r>
           </a:p>
           <a:p>
@@ -1265,6 +1265,16 @@
               <a:buFont typeface="+mj-lt"/>
               <a:buAutoNum type="arabicPeriod"/>
             </a:pPr>
+            <a:r>
+              <a:rPr lang="en-US" sz="2000" dirty="0"/>
+              <a:t>The service layer will be built using the spring boot framework. </a:t>
+            </a:r>
+          </a:p>
+          <a:p>
+            <a:pPr marL="228600" indent="-228600">
+              <a:buFont typeface="+mj-lt"/>
+              <a:buAutoNum type="arabicPeriod"/>
+            </a:pPr>
             <a:endParaRPr lang="en-US" sz="2000" dirty="0"/>
           </a:p>
           <a:p>
@@ -1291,7 +1301,7 @@
             </a:pPr>
             <a:r>
               <a:rPr lang="en-US" sz="2000" dirty="0"/>
-              <a:t>The PERSISTENCE layer is home to the MongoDB database hosted on MongoDB atlas. The database only communicates with the service layer.</a:t>
+              <a:t>The PERSISTENCE layer is home to the MongoDB database hosted on MongoDB atlas. The database will only communicate with the service layer.</a:t>
             </a:r>
           </a:p>
           <a:p>
@@ -1308,7 +1318,7 @@
             </a:pPr>
             <a:r>
               <a:rPr lang="en-US" sz="2000" dirty="0"/>
-              <a:t>The PERSISTENCE layer is also home to the amazon S3 storage bucket. This is currently contacted by the directly by the PRESENTATION layer to store and view images. However if the need arises to modify or edit the images before uploading them, the storage of the images may be moved to the service layer to take processing load away from the client in the interest of speed.</a:t>
+              <a:t>The PERSISTENCE layer is also home to the amazon S3 storage bucket. This is currently contacted directly by the PRESENTATION layer to store and view images. However if the need arises to modify or edit the images before uploading them, the storage of the images may be moved to the service layer to take the processing load away from the client in the interest of speed.</a:t>
             </a:r>
           </a:p>
           <a:p>
@@ -1542,6 +1552,21 @@
           <a:bodyPr/>
           <a:lstStyle/>
           <a:p>
+            <a:r>
+              <a:rPr lang="en-US" dirty="0"/>
+              <a:t>This is the list of current future requirements for the project, </a:t>
+            </a:r>
+          </a:p>
+          <a:p>
+            <a:endParaRPr lang="en-US" dirty="0"/>
+          </a:p>
+          <a:p>
+            <a:r>
+              <a:rPr lang="en-US" dirty="0"/>
+              <a:t>The main requirement on here is the booking functionality which will allow users to actually create a booking for a service.</a:t>
+            </a:r>
+          </a:p>
+          <a:p>
             <a:endParaRPr lang="en-US" dirty="0"/>
           </a:p>
         </p:txBody>
@@ -1626,7 +1651,19 @@
           <a:bodyPr/>
           <a:lstStyle/>
           <a:p>
+            <a:r>
+              <a:rPr lang="en-US" dirty="0"/>
+              <a:t>This is my project timeline, I have tried to split the requirements into three groupings based on the three project demos. </a:t>
+            </a:r>
+          </a:p>
+          <a:p>
             <a:endParaRPr lang="en-US" dirty="0"/>
+          </a:p>
+          <a:p>
+            <a:r>
+              <a:rPr lang="en-US" dirty="0"/>
+              <a:t>I done this because it was the clearest deadlines I could use to try put some structure into my plan</a:t>
+            </a:r>
           </a:p>
         </p:txBody>
       </p:sp>
@@ -1813,7 +1850,7 @@
           <a:p>
             <a:fld id="{DECF21A4-E71B-4D3A-AF45-E989C23A7BB1}" type="datetimeFigureOut">
               <a:rPr lang="en-US" smtClean="0"/>
-              <a:t>11/21/2020</a:t>
+              <a:t>12/1/2020</a:t>
             </a:fld>
             <a:endParaRPr lang="en-US" dirty="0"/>
           </a:p>
@@ -2011,7 +2048,7 @@
           <a:p>
             <a:fld id="{DECF21A4-E71B-4D3A-AF45-E989C23A7BB1}" type="datetimeFigureOut">
               <a:rPr lang="en-US" smtClean="0"/>
-              <a:t>11/21/2020</a:t>
+              <a:t>12/1/2020</a:t>
             </a:fld>
             <a:endParaRPr lang="en-US" dirty="0"/>
           </a:p>
@@ -2219,7 +2256,7 @@
           <a:p>
             <a:fld id="{DECF21A4-E71B-4D3A-AF45-E989C23A7BB1}" type="datetimeFigureOut">
               <a:rPr lang="en-US" smtClean="0"/>
-              <a:t>11/21/2020</a:t>
+              <a:t>12/1/2020</a:t>
             </a:fld>
             <a:endParaRPr lang="en-US" dirty="0"/>
           </a:p>
@@ -2417,7 +2454,7 @@
           <a:p>
             <a:fld id="{DECF21A4-E71B-4D3A-AF45-E989C23A7BB1}" type="datetimeFigureOut">
               <a:rPr lang="en-US" smtClean="0"/>
-              <a:t>11/21/2020</a:t>
+              <a:t>12/1/2020</a:t>
             </a:fld>
             <a:endParaRPr lang="en-US" dirty="0"/>
           </a:p>
@@ -2692,7 +2729,7 @@
           <a:p>
             <a:fld id="{DECF21A4-E71B-4D3A-AF45-E989C23A7BB1}" type="datetimeFigureOut">
               <a:rPr lang="en-US" smtClean="0"/>
-              <a:t>11/21/2020</a:t>
+              <a:t>12/1/2020</a:t>
             </a:fld>
             <a:endParaRPr lang="en-US" dirty="0"/>
           </a:p>
@@ -2957,7 +2994,7 @@
           <a:p>
             <a:fld id="{DECF21A4-E71B-4D3A-AF45-E989C23A7BB1}" type="datetimeFigureOut">
               <a:rPr lang="en-US" smtClean="0"/>
-              <a:t>11/21/2020</a:t>
+              <a:t>12/1/2020</a:t>
             </a:fld>
             <a:endParaRPr lang="en-US" dirty="0"/>
           </a:p>
@@ -3369,7 +3406,7 @@
           <a:p>
             <a:fld id="{DECF21A4-E71B-4D3A-AF45-E989C23A7BB1}" type="datetimeFigureOut">
               <a:rPr lang="en-US" smtClean="0"/>
-              <a:t>11/21/2020</a:t>
+              <a:t>12/1/2020</a:t>
             </a:fld>
             <a:endParaRPr lang="en-US" dirty="0"/>
           </a:p>
@@ -3510,7 +3547,7 @@
           <a:p>
             <a:fld id="{DECF21A4-E71B-4D3A-AF45-E989C23A7BB1}" type="datetimeFigureOut">
               <a:rPr lang="en-US" smtClean="0"/>
-              <a:t>11/21/2020</a:t>
+              <a:t>12/1/2020</a:t>
             </a:fld>
             <a:endParaRPr lang="en-US" dirty="0"/>
           </a:p>
@@ -3623,7 +3660,7 @@
           <a:p>
             <a:fld id="{DECF21A4-E71B-4D3A-AF45-E989C23A7BB1}" type="datetimeFigureOut">
               <a:rPr lang="en-US" smtClean="0"/>
-              <a:t>11/21/2020</a:t>
+              <a:t>12/1/2020</a:t>
             </a:fld>
             <a:endParaRPr lang="en-US" dirty="0"/>
           </a:p>
@@ -3934,7 +3971,7 @@
           <a:p>
             <a:fld id="{DECF21A4-E71B-4D3A-AF45-E989C23A7BB1}" type="datetimeFigureOut">
               <a:rPr lang="en-US" smtClean="0"/>
-              <a:t>11/21/2020</a:t>
+              <a:t>12/1/2020</a:t>
             </a:fld>
             <a:endParaRPr lang="en-US" dirty="0"/>
           </a:p>
@@ -4226,7 +4263,7 @@
           <a:p>
             <a:fld id="{DECF21A4-E71B-4D3A-AF45-E989C23A7BB1}" type="datetimeFigureOut">
               <a:rPr lang="en-US" smtClean="0"/>
-              <a:t>11/21/2020</a:t>
+              <a:t>12/1/2020</a:t>
             </a:fld>
             <a:endParaRPr lang="en-US" dirty="0"/>
           </a:p>
@@ -4467,7 +4504,7 @@
           <a:p>
             <a:fld id="{DECF21A4-E71B-4D3A-AF45-E989C23A7BB1}" type="datetimeFigureOut">
               <a:rPr lang="en-US" smtClean="0"/>
-              <a:t>11/21/2020</a:t>
+              <a:t>12/1/2020</a:t>
             </a:fld>
             <a:endParaRPr lang="en-US" dirty="0"/>
           </a:p>
@@ -11955,20 +11992,20 @@
 </file>
 
 <file path=customXml/item2.xml><?xml version="1.0" encoding="utf-8"?>
+<p:properties xmlns:p="http://schemas.microsoft.com/office/2006/metadata/properties" xmlns:xsi="http://www.w3.org/2001/XMLSchema-instance" xmlns:pc="http://schemas.microsoft.com/office/infopath/2007/PartnerControls">
+  <documentManagement>
+    <MediaServiceKeyPoints xmlns="71af3243-3dd4-4a8d-8c0d-dd76da1f02a5" xsi:nil="true"/>
+  </documentManagement>
+</p:properties>
+</file>
+
+<file path=customXml/item3.xml><?xml version="1.0" encoding="utf-8"?>
 <?mso-contentType ?>
 <FormTemplates xmlns="http://schemas.microsoft.com/sharepoint/v3/contenttype/forms">
   <Display>DocumentLibraryForm</Display>
   <Edit>DocumentLibraryForm</Edit>
   <New>DocumentLibraryForm</New>
 </FormTemplates>
-</file>
-
-<file path=customXml/item3.xml><?xml version="1.0" encoding="utf-8"?>
-<p:properties xmlns:p="http://schemas.microsoft.com/office/2006/metadata/properties" xmlns:xsi="http://www.w3.org/2001/XMLSchema-instance" xmlns:pc="http://schemas.microsoft.com/office/infopath/2007/PartnerControls">
-  <documentManagement>
-    <MediaServiceKeyPoints xmlns="71af3243-3dd4-4a8d-8c0d-dd76da1f02a5" xsi:nil="true"/>
-  </documentManagement>
-</p:properties>
 </file>
 
 <file path=customXml/itemProps1.xml><?xml version="1.0" encoding="utf-8"?>
@@ -11991,14 +12028,6 @@
 </file>
 
 <file path=customXml/itemProps2.xml><?xml version="1.0" encoding="utf-8"?>
-<ds:datastoreItem xmlns:ds="http://schemas.openxmlformats.org/officeDocument/2006/customXml" ds:itemID="{5CA875DA-F9FD-4F83-A049-3B1027B542DE}">
-  <ds:schemaRefs>
-    <ds:schemaRef ds:uri="http://schemas.microsoft.com/sharepoint/v3/contenttype/forms"/>
-  </ds:schemaRefs>
-</ds:datastoreItem>
-</file>
-
-<file path=customXml/itemProps3.xml><?xml version="1.0" encoding="utf-8"?>
 <ds:datastoreItem xmlns:ds="http://schemas.openxmlformats.org/officeDocument/2006/customXml" ds:itemID="{03C7D9E6-B0D9-433E-BD46-EB60F64F4DA8}">
   <ds:schemaRefs>
     <ds:schemaRef ds:uri="http://schemas.microsoft.com/office/2006/metadata/properties"/>
@@ -12006,4 +12035,12 @@
     <ds:schemaRef ds:uri="71af3243-3dd4-4a8d-8c0d-dd76da1f02a5"/>
   </ds:schemaRefs>
 </ds:datastoreItem>
+</file>
+
+<file path=customXml/itemProps3.xml><?xml version="1.0" encoding="utf-8"?>
+<ds:datastoreItem xmlns:ds="http://schemas.openxmlformats.org/officeDocument/2006/customXml" ds:itemID="{5CA875DA-F9FD-4F83-A049-3B1027B542DE}">
+  <ds:schemaRefs>
+    <ds:schemaRef ds:uri="http://schemas.microsoft.com/sharepoint/v3/contenttype/forms"/>
+  </ds:schemaRefs>
+</ds:datastoreItem>
 </file>
</xml_diff>